<commit_message>
infodumping be like :3c
</commit_message>
<xml_diff>
--- a/1. rocnik/SLOVENČINA/LAKOMEC.pptx
+++ b/1. rocnik/SLOVENČINA/LAKOMEC.pptx
@@ -110,6 +110,22 @@
       </a:defRPr>
     </a:lvl9pPr>
   </p:defaultTextStyle>
+  <p:extLst>
+    <p:ext uri="{EFAFB233-063F-42B5-8137-9DF3F51BA10A}">
+      <p15:sldGuideLst xmlns:p15="http://schemas.microsoft.com/office/powerpoint/2012/main">
+        <p15:guide id="1" orient="horz" pos="2160">
+          <p15:clr>
+            <a:srgbClr val="A4A3A4"/>
+          </p15:clr>
+        </p15:guide>
+        <p15:guide id="2" pos="2880">
+          <p15:clr>
+            <a:srgbClr val="A4A3A4"/>
+          </p15:clr>
+        </p15:guide>
+      </p15:sldGuideLst>
+    </p:ext>
+  </p:extLst>
 </p:presentation>
 </file>
 
@@ -403,7 +419,7 @@
           <a:p>
             <a:fld id="{85A88DC5-42F5-4FB4-A531-C2A69BD9E596}" type="datetimeFigureOut">
               <a:rPr lang="sk-SK" smtClean="0"/>
-              <a:t>7.12.2022</a:t>
+              <a:t>5. 6. 2025</a:t>
             </a:fld>
             <a:endParaRPr lang="sk-SK"/>
           </a:p>
@@ -456,11 +472,11 @@
   <p:clrMapOvr>
     <a:masterClrMapping/>
   </p:clrMapOvr>
-  <mc:AlternateContent xmlns:mc="http://schemas.openxmlformats.org/markup-compatibility/2006">
-    <mc:Choice xmlns:p14="http://schemas.microsoft.com/office/powerpoint/2010/main" Requires="p14">
+  <mc:AlternateContent xmlns:mc="http://schemas.openxmlformats.org/markup-compatibility/2006" xmlns:p14="http://schemas.microsoft.com/office/powerpoint/2010/main">
+    <mc:Choice Requires="p14">
       <p:transition spd="slow" p14:dur="2000"/>
     </mc:Choice>
-    <mc:Fallback>
+    <mc:Fallback xmlns="">
       <p:transition spd="slow"/>
     </mc:Fallback>
   </mc:AlternateContent>
@@ -576,7 +592,7 @@
           <a:p>
             <a:fld id="{85A88DC5-42F5-4FB4-A531-C2A69BD9E596}" type="datetimeFigureOut">
               <a:rPr lang="sk-SK" smtClean="0"/>
-              <a:t>7.12.2022</a:t>
+              <a:t>5. 6. 2025</a:t>
             </a:fld>
             <a:endParaRPr lang="sk-SK"/>
           </a:p>
@@ -629,11 +645,11 @@
   <p:clrMapOvr>
     <a:masterClrMapping/>
   </p:clrMapOvr>
-  <mc:AlternateContent xmlns:mc="http://schemas.openxmlformats.org/markup-compatibility/2006">
-    <mc:Choice xmlns:p14="http://schemas.microsoft.com/office/powerpoint/2010/main" Requires="p14">
+  <mc:AlternateContent xmlns:mc="http://schemas.openxmlformats.org/markup-compatibility/2006" xmlns:p14="http://schemas.microsoft.com/office/powerpoint/2010/main">
+    <mc:Choice Requires="p14">
       <p:transition spd="slow" p14:dur="2000"/>
     </mc:Choice>
-    <mc:Fallback>
+    <mc:Fallback xmlns="">
       <p:transition spd="slow"/>
     </mc:Fallback>
   </mc:AlternateContent>
@@ -759,7 +775,7 @@
           <a:p>
             <a:fld id="{85A88DC5-42F5-4FB4-A531-C2A69BD9E596}" type="datetimeFigureOut">
               <a:rPr lang="sk-SK" smtClean="0"/>
-              <a:t>7.12.2022</a:t>
+              <a:t>5. 6. 2025</a:t>
             </a:fld>
             <a:endParaRPr lang="sk-SK"/>
           </a:p>
@@ -812,11 +828,11 @@
   <p:clrMapOvr>
     <a:masterClrMapping/>
   </p:clrMapOvr>
-  <mc:AlternateContent xmlns:mc="http://schemas.openxmlformats.org/markup-compatibility/2006">
-    <mc:Choice xmlns:p14="http://schemas.microsoft.com/office/powerpoint/2010/main" Requires="p14">
+  <mc:AlternateContent xmlns:mc="http://schemas.openxmlformats.org/markup-compatibility/2006" xmlns:p14="http://schemas.microsoft.com/office/powerpoint/2010/main">
+    <mc:Choice Requires="p14">
       <p:transition spd="slow" p14:dur="2000"/>
     </mc:Choice>
-    <mc:Fallback>
+    <mc:Fallback xmlns="">
       <p:transition spd="slow"/>
     </mc:Fallback>
   </mc:AlternateContent>
@@ -914,7 +930,7 @@
           <a:p>
             <a:fld id="{85A88DC5-42F5-4FB4-A531-C2A69BD9E596}" type="datetimeFigureOut">
               <a:rPr lang="sk-SK" smtClean="0"/>
-              <a:t>7.12.2022</a:t>
+              <a:t>5. 6. 2025</a:t>
             </a:fld>
             <a:endParaRPr lang="sk-SK"/>
           </a:p>
@@ -994,11 +1010,11 @@
   <p:clrMapOvr>
     <a:masterClrMapping/>
   </p:clrMapOvr>
-  <mc:AlternateContent xmlns:mc="http://schemas.openxmlformats.org/markup-compatibility/2006">
-    <mc:Choice xmlns:p14="http://schemas.microsoft.com/office/powerpoint/2010/main" Requires="p14">
+  <mc:AlternateContent xmlns:mc="http://schemas.openxmlformats.org/markup-compatibility/2006" xmlns:p14="http://schemas.microsoft.com/office/powerpoint/2010/main">
+    <mc:Choice Requires="p14">
       <p:transition spd="slow" p14:dur="2000"/>
     </mc:Choice>
-    <mc:Fallback>
+    <mc:Fallback xmlns="">
       <p:transition spd="slow"/>
     </mc:Fallback>
   </mc:AlternateContent>
@@ -1039,7 +1055,7 @@
           <a:p>
             <a:fld id="{85A88DC5-42F5-4FB4-A531-C2A69BD9E596}" type="datetimeFigureOut">
               <a:rPr lang="sk-SK" smtClean="0"/>
-              <a:t>7.12.2022</a:t>
+              <a:t>5. 6. 2025</a:t>
             </a:fld>
             <a:endParaRPr lang="sk-SK"/>
           </a:p>
@@ -1272,11 +1288,11 @@
   <p:clrMapOvr>
     <a:masterClrMapping/>
   </p:clrMapOvr>
-  <mc:AlternateContent xmlns:mc="http://schemas.openxmlformats.org/markup-compatibility/2006">
-    <mc:Choice xmlns:p14="http://schemas.microsoft.com/office/powerpoint/2010/main" Requires="p14">
+  <mc:AlternateContent xmlns:mc="http://schemas.openxmlformats.org/markup-compatibility/2006" xmlns:p14="http://schemas.microsoft.com/office/powerpoint/2010/main">
+    <mc:Choice Requires="p14">
       <p:transition spd="slow" p14:dur="2000"/>
     </mc:Choice>
-    <mc:Fallback>
+    <mc:Fallback xmlns="">
       <p:transition spd="slow"/>
     </mc:Fallback>
   </mc:AlternateContent>
@@ -1317,7 +1333,7 @@
           <a:p>
             <a:fld id="{85A88DC5-42F5-4FB4-A531-C2A69BD9E596}" type="datetimeFigureOut">
               <a:rPr lang="sk-SK" smtClean="0"/>
-              <a:t>7.12.2022</a:t>
+              <a:t>5. 6. 2025</a:t>
             </a:fld>
             <a:endParaRPr lang="sk-SK"/>
           </a:p>
@@ -1507,11 +1523,11 @@
   <p:clrMapOvr>
     <a:masterClrMapping/>
   </p:clrMapOvr>
-  <mc:AlternateContent xmlns:mc="http://schemas.openxmlformats.org/markup-compatibility/2006">
-    <mc:Choice xmlns:p14="http://schemas.microsoft.com/office/powerpoint/2010/main" Requires="p14">
+  <mc:AlternateContent xmlns:mc="http://schemas.openxmlformats.org/markup-compatibility/2006" xmlns:p14="http://schemas.microsoft.com/office/powerpoint/2010/main">
+    <mc:Choice Requires="p14">
       <p:transition spd="slow" p14:dur="2000"/>
     </mc:Choice>
-    <mc:Fallback>
+    <mc:Fallback xmlns="">
       <p:transition spd="slow"/>
     </mc:Fallback>
   </mc:AlternateContent>
@@ -1594,7 +1610,7 @@
           <a:p>
             <a:fld id="{85A88DC5-42F5-4FB4-A531-C2A69BD9E596}" type="datetimeFigureOut">
               <a:rPr lang="sk-SK" smtClean="0"/>
-              <a:t>7.12.2022</a:t>
+              <a:t>5. 6. 2025</a:t>
             </a:fld>
             <a:endParaRPr lang="sk-SK"/>
           </a:p>
@@ -2004,11 +2020,11 @@
   <p:clrMapOvr>
     <a:masterClrMapping/>
   </p:clrMapOvr>
-  <mc:AlternateContent xmlns:mc="http://schemas.openxmlformats.org/markup-compatibility/2006">
-    <mc:Choice xmlns:p14="http://schemas.microsoft.com/office/powerpoint/2010/main" Requires="p14">
+  <mc:AlternateContent xmlns:mc="http://schemas.openxmlformats.org/markup-compatibility/2006" xmlns:p14="http://schemas.microsoft.com/office/powerpoint/2010/main">
+    <mc:Choice Requires="p14">
       <p:transition spd="slow" p14:dur="2000"/>
     </mc:Choice>
-    <mc:Fallback>
+    <mc:Fallback xmlns="">
       <p:transition spd="slow"/>
     </mc:Fallback>
   </mc:AlternateContent>
@@ -2049,7 +2065,7 @@
           <a:p>
             <a:fld id="{85A88DC5-42F5-4FB4-A531-C2A69BD9E596}" type="datetimeFigureOut">
               <a:rPr lang="sk-SK" smtClean="0"/>
-              <a:t>7.12.2022</a:t>
+              <a:t>5. 6. 2025</a:t>
             </a:fld>
             <a:endParaRPr lang="sk-SK"/>
           </a:p>
@@ -2125,11 +2141,11 @@
   <p:clrMapOvr>
     <a:masterClrMapping/>
   </p:clrMapOvr>
-  <mc:AlternateContent xmlns:mc="http://schemas.openxmlformats.org/markup-compatibility/2006">
-    <mc:Choice xmlns:p14="http://schemas.microsoft.com/office/powerpoint/2010/main" Requires="p14">
+  <mc:AlternateContent xmlns:mc="http://schemas.openxmlformats.org/markup-compatibility/2006" xmlns:p14="http://schemas.microsoft.com/office/powerpoint/2010/main">
+    <mc:Choice Requires="p14">
       <p:transition spd="slow" p14:dur="2000"/>
     </mc:Choice>
-    <mc:Fallback>
+    <mc:Fallback xmlns="">
       <p:transition spd="slow"/>
     </mc:Fallback>
   </mc:AlternateContent>
@@ -2170,7 +2186,7 @@
           <a:p>
             <a:fld id="{85A88DC5-42F5-4FB4-A531-C2A69BD9E596}" type="datetimeFigureOut">
               <a:rPr lang="sk-SK" smtClean="0"/>
-              <a:t>7.12.2022</a:t>
+              <a:t>5. 6. 2025</a:t>
             </a:fld>
             <a:endParaRPr lang="sk-SK"/>
           </a:p>
@@ -2223,11 +2239,11 @@
   <p:clrMapOvr>
     <a:masterClrMapping/>
   </p:clrMapOvr>
-  <mc:AlternateContent xmlns:mc="http://schemas.openxmlformats.org/markup-compatibility/2006">
-    <mc:Choice xmlns:p14="http://schemas.microsoft.com/office/powerpoint/2010/main" Requires="p14">
+  <mc:AlternateContent xmlns:mc="http://schemas.openxmlformats.org/markup-compatibility/2006" xmlns:p14="http://schemas.microsoft.com/office/powerpoint/2010/main">
+    <mc:Choice Requires="p14">
       <p:transition spd="slow" p14:dur="2000"/>
     </mc:Choice>
-    <mc:Fallback>
+    <mc:Fallback xmlns="">
       <p:transition spd="slow"/>
     </mc:Fallback>
   </mc:AlternateContent>
@@ -2428,7 +2444,7 @@
           <a:p>
             <a:fld id="{85A88DC5-42F5-4FB4-A531-C2A69BD9E596}" type="datetimeFigureOut">
               <a:rPr lang="sk-SK" smtClean="0"/>
-              <a:t>7.12.2022</a:t>
+              <a:t>5. 6. 2025</a:t>
             </a:fld>
             <a:endParaRPr lang="sk-SK"/>
           </a:p>
@@ -2481,11 +2497,11 @@
   <p:clrMapOvr>
     <a:masterClrMapping/>
   </p:clrMapOvr>
-  <mc:AlternateContent xmlns:mc="http://schemas.openxmlformats.org/markup-compatibility/2006">
-    <mc:Choice xmlns:p14="http://schemas.microsoft.com/office/powerpoint/2010/main" Requires="p14">
+  <mc:AlternateContent xmlns:mc="http://schemas.openxmlformats.org/markup-compatibility/2006" xmlns:p14="http://schemas.microsoft.com/office/powerpoint/2010/main">
+    <mc:Choice Requires="p14">
       <p:transition spd="slow" p14:dur="2000"/>
     </mc:Choice>
-    <mc:Fallback>
+    <mc:Fallback xmlns="">
       <p:transition spd="slow"/>
     </mc:Fallback>
   </mc:AlternateContent>
@@ -2676,7 +2692,7 @@
           <a:p>
             <a:fld id="{85A88DC5-42F5-4FB4-A531-C2A69BD9E596}" type="datetimeFigureOut">
               <a:rPr lang="sk-SK" smtClean="0"/>
-              <a:t>7.12.2022</a:t>
+              <a:t>5. 6. 2025</a:t>
             </a:fld>
             <a:endParaRPr lang="sk-SK"/>
           </a:p>
@@ -2729,11 +2745,11 @@
   <p:clrMapOvr>
     <a:masterClrMapping/>
   </p:clrMapOvr>
-  <mc:AlternateContent xmlns:mc="http://schemas.openxmlformats.org/markup-compatibility/2006">
-    <mc:Choice xmlns:p14="http://schemas.microsoft.com/office/powerpoint/2010/main" Requires="p14">
+  <mc:AlternateContent xmlns:mc="http://schemas.openxmlformats.org/markup-compatibility/2006" xmlns:p14="http://schemas.microsoft.com/office/powerpoint/2010/main">
+    <mc:Choice Requires="p14">
       <p:transition spd="slow" p14:dur="2000"/>
     </mc:Choice>
-    <mc:Fallback>
+    <mc:Fallback xmlns="">
       <p:transition spd="slow"/>
     </mc:Fallback>
   </mc:AlternateContent>
@@ -2857,7 +2873,7 @@
           <a:p>
             <a:fld id="{85A88DC5-42F5-4FB4-A531-C2A69BD9E596}" type="datetimeFigureOut">
               <a:rPr lang="sk-SK" smtClean="0"/>
-              <a:t>7.12.2022</a:t>
+              <a:t>5. 6. 2025</a:t>
             </a:fld>
             <a:endParaRPr lang="sk-SK"/>
           </a:p>
@@ -2992,11 +3008,11 @@
     <p:sldLayoutId id="2147483682" r:id="rId10"/>
     <p:sldLayoutId id="2147483683" r:id="rId11"/>
   </p:sldLayoutIdLst>
-  <mc:AlternateContent xmlns:mc="http://schemas.openxmlformats.org/markup-compatibility/2006">
-    <mc:Choice xmlns:p14="http://schemas.microsoft.com/office/powerpoint/2010/main" Requires="p14">
+  <mc:AlternateContent xmlns:mc="http://schemas.openxmlformats.org/markup-compatibility/2006" xmlns:p14="http://schemas.microsoft.com/office/powerpoint/2010/main">
+    <mc:Choice Requires="p14">
       <p:transition spd="slow" p14:dur="2000"/>
     </mc:Choice>
-    <mc:Fallback>
+    <mc:Fallback xmlns="">
       <p:transition spd="slow"/>
     </mc:Fallback>
   </mc:AlternateContent>
@@ -3425,13 +3441,13 @@
   <p:clrMapOvr>
     <a:masterClrMapping/>
   </p:clrMapOvr>
-  <mc:AlternateContent xmlns:mc="http://schemas.openxmlformats.org/markup-compatibility/2006">
-    <mc:Choice xmlns:p14="http://schemas.microsoft.com/office/powerpoint/2010/main" Requires="p14">
+  <mc:AlternateContent xmlns:mc="http://schemas.openxmlformats.org/markup-compatibility/2006" xmlns:p14="http://schemas.microsoft.com/office/powerpoint/2010/main">
+    <mc:Choice Requires="p14">
       <p:transition spd="med" p14:dur="700">
         <p:fade/>
       </p:transition>
     </mc:Choice>
-    <mc:Fallback>
+    <mc:Fallback xmlns="">
       <p:transition spd="med">
         <p:fade/>
       </p:transition>
@@ -3670,13 +3686,13 @@
   <p:clrMapOvr>
     <a:masterClrMapping/>
   </p:clrMapOvr>
-  <mc:AlternateContent xmlns:mc="http://schemas.openxmlformats.org/markup-compatibility/2006">
-    <mc:Choice xmlns:p14="http://schemas.microsoft.com/office/powerpoint/2010/main" Requires="p14">
+  <mc:AlternateContent xmlns:mc="http://schemas.openxmlformats.org/markup-compatibility/2006" xmlns:p14="http://schemas.microsoft.com/office/powerpoint/2010/main">
+    <mc:Choice Requires="p14">
       <p:transition spd="med" p14:dur="700">
         <p:fade/>
       </p:transition>
     </mc:Choice>
-    <mc:Fallback>
+    <mc:Fallback xmlns="">
       <p:transition spd="med">
         <p:fade/>
       </p:transition>
@@ -3774,11 +3790,7 @@
           <a:p>
             <a:r>
               <a:rPr lang="sk-SK" sz="2200" dirty="0" smtClean="0"/>
-              <a:t>5 </a:t>
-            </a:r>
-            <a:r>
-              <a:rPr lang="sk-SK" sz="2200" dirty="0" smtClean="0"/>
-              <a:t>dejstiev</a:t>
+              <a:t>5 dejstiev</a:t>
             </a:r>
           </a:p>
           <a:p>
@@ -3910,13 +3922,13 @@
   <p:clrMapOvr>
     <a:masterClrMapping/>
   </p:clrMapOvr>
-  <mc:AlternateContent xmlns:mc="http://schemas.openxmlformats.org/markup-compatibility/2006">
-    <mc:Choice xmlns:p14="http://schemas.microsoft.com/office/powerpoint/2010/main" Requires="p14">
+  <mc:AlternateContent xmlns:mc="http://schemas.openxmlformats.org/markup-compatibility/2006" xmlns:p14="http://schemas.microsoft.com/office/powerpoint/2010/main">
+    <mc:Choice Requires="p14">
       <p:transition spd="med" p14:dur="700">
         <p:fade/>
       </p:transition>
     </mc:Choice>
-    <mc:Fallback>
+    <mc:Fallback xmlns="">
       <p:transition spd="med">
         <p:fade/>
       </p:transition>
@@ -4149,7 +4161,11 @@
           <a:p>
             <a:r>
               <a:rPr lang="sk-SK" dirty="0" smtClean="0"/>
-              <a:t>V EDĽAJŚIE POSTAVY – </a:t>
+              <a:t>VEDĽAJŚIE </a:t>
+            </a:r>
+            <a:r>
+              <a:rPr lang="sk-SK" dirty="0" smtClean="0"/>
+              <a:t>POSTAVY – </a:t>
             </a:r>
             <a:r>
               <a:rPr lang="sk-SK" dirty="0" err="1" smtClean="0"/>
@@ -4167,16 +4183,11 @@
               <a:rPr lang="sk-SK" dirty="0" smtClean="0"/>
               <a:t>, Šidlo, </a:t>
             </a:r>
-            <a:endParaRPr lang="sk-SK" dirty="0" smtClean="0"/>
           </a:p>
           <a:p>
             <a:r>
               <a:rPr lang="sk-SK" dirty="0" smtClean="0"/>
-              <a:t>Majster </a:t>
-            </a:r>
-            <a:r>
-              <a:rPr lang="sk-SK" dirty="0" smtClean="0"/>
-              <a:t>Šimon</a:t>
+              <a:t>Majster Šimon</a:t>
             </a:r>
             <a:endParaRPr lang="sk-SK" dirty="0"/>
           </a:p>
@@ -4222,13 +4233,13 @@
   <p:clrMapOvr>
     <a:masterClrMapping/>
   </p:clrMapOvr>
-  <mc:AlternateContent xmlns:mc="http://schemas.openxmlformats.org/markup-compatibility/2006">
-    <mc:Choice xmlns:p14="http://schemas.microsoft.com/office/powerpoint/2010/main" Requires="p14">
+  <mc:AlternateContent xmlns:mc="http://schemas.openxmlformats.org/markup-compatibility/2006" xmlns:p14="http://schemas.microsoft.com/office/powerpoint/2010/main">
+    <mc:Choice Requires="p14">
       <p:transition spd="med" p14:dur="700">
         <p:fade/>
       </p:transition>
     </mc:Choice>
-    <mc:Fallback>
+    <mc:Fallback xmlns="">
       <p:transition spd="med">
         <p:fade/>
       </p:transition>
@@ -4285,7 +4296,15 @@
           <a:p>
             <a:r>
               <a:rPr lang="sk-SK" dirty="0" smtClean="0"/>
-              <a:t>EXPOZÍCIA ( úvod)</a:t>
+              <a:t>EXPOZÍCIA </a:t>
+            </a:r>
+            <a:r>
+              <a:rPr lang="sk-SK" dirty="0" smtClean="0"/>
+              <a:t>(úvod</a:t>
+            </a:r>
+            <a:r>
+              <a:rPr lang="sk-SK" dirty="0" smtClean="0"/>
+              <a:t>)</a:t>
             </a:r>
           </a:p>
           <a:p>
@@ -4479,8 +4498,16 @@
           <a:lstStyle/>
           <a:p>
             <a:r>
+              <a:rPr lang="sk-SK" smtClean="0"/>
+              <a:t>KATASTROFA </a:t>
+            </a:r>
+            <a:r>
+              <a:rPr lang="sk-SK" smtClean="0"/>
+              <a:t>(rozuzlenie</a:t>
+            </a:r>
+            <a:r>
               <a:rPr lang="sk-SK" dirty="0" smtClean="0"/>
-              <a:t>KATASTROFA ( rozuzlenie)</a:t>
+              <a:t>)</a:t>
             </a:r>
           </a:p>
           <a:p>
@@ -4548,13 +4575,13 @@
   <p:clrMapOvr>
     <a:masterClrMapping/>
   </p:clrMapOvr>
-  <mc:AlternateContent xmlns:mc="http://schemas.openxmlformats.org/markup-compatibility/2006">
-    <mc:Choice xmlns:p14="http://schemas.microsoft.com/office/powerpoint/2010/main" Requires="p14">
+  <mc:AlternateContent xmlns:mc="http://schemas.openxmlformats.org/markup-compatibility/2006" xmlns:p14="http://schemas.microsoft.com/office/powerpoint/2010/main">
+    <mc:Choice Requires="p14">
       <p:transition spd="med" p14:dur="700">
         <p:fade/>
       </p:transition>
     </mc:Choice>
-    <mc:Fallback>
+    <mc:Fallback xmlns="">
       <p:transition spd="med">
         <p:fade/>
       </p:transition>
@@ -4720,13 +4747,13 @@
   <p:clrMapOvr>
     <a:masterClrMapping/>
   </p:clrMapOvr>
-  <mc:AlternateContent xmlns:mc="http://schemas.openxmlformats.org/markup-compatibility/2006">
-    <mc:Choice xmlns:p14="http://schemas.microsoft.com/office/powerpoint/2010/main" Requires="p14">
+  <mc:AlternateContent xmlns:mc="http://schemas.openxmlformats.org/markup-compatibility/2006" xmlns:p14="http://schemas.microsoft.com/office/powerpoint/2010/main">
+    <mc:Choice Requires="p14">
       <p:transition spd="med" p14:dur="700">
         <p:fade/>
       </p:transition>
     </mc:Choice>
-    <mc:Fallback>
+    <mc:Fallback xmlns="">
       <p:transition spd="med">
         <p:fade/>
       </p:transition>
@@ -4798,13 +4825,13 @@
   <p:clrMapOvr>
     <a:masterClrMapping/>
   </p:clrMapOvr>
-  <mc:AlternateContent xmlns:mc="http://schemas.openxmlformats.org/markup-compatibility/2006">
-    <mc:Choice xmlns:p14="http://schemas.microsoft.com/office/powerpoint/2010/main" Requires="p14">
+  <mc:AlternateContent xmlns:mc="http://schemas.openxmlformats.org/markup-compatibility/2006" xmlns:p14="http://schemas.microsoft.com/office/powerpoint/2010/main">
+    <mc:Choice Requires="p14">
       <p:transition spd="med" p14:dur="700">
         <p:fade/>
       </p:transition>
     </mc:Choice>
-    <mc:Fallback>
+    <mc:Fallback xmlns="">
       <p:transition spd="med">
         <p:fade/>
       </p:transition>

</xml_diff>